<commit_message>
update ppt dan upload dokumentasi
</commit_message>
<xml_diff>
--- a/docs/algoritma.pptx
+++ b/docs/algoritma.pptx
@@ -4627,8 +4627,17 @@
               <a:rPr lang="en-GB" sz="3200" dirty="0" smtClean="0">
                 <a:latin typeface="+mj-lt"/>
               </a:rPr>
-              <a:t>Evaria Ayu Nurjana</a:t>
-            </a:r>
+              <a:t>Evaria Ayu </a:t>
+            </a:r>
+            <a:r>
+              <a:rPr lang="en-GB" sz="3200" dirty="0" smtClean="0">
+                <a:latin typeface="+mj-lt"/>
+              </a:rPr>
+              <a:t>Nurjana (5112100060)</a:t>
+            </a:r>
+            <a:endParaRPr lang="en-GB" sz="3200" dirty="0" smtClean="0">
+              <a:latin typeface="+mj-lt"/>
+            </a:endParaRPr>
           </a:p>
           <a:p>
             <a:r>
@@ -4649,6 +4658,12 @@
               </a:rPr>
               <a:t>Hasbiya</a:t>
             </a:r>
+            <a:r>
+              <a:rPr lang="en-GB" sz="3200" dirty="0" smtClean="0">
+                <a:latin typeface="+mj-lt"/>
+              </a:rPr>
+              <a:t> (5112100083)</a:t>
+            </a:r>
             <a:endParaRPr lang="en-GB" sz="3200" dirty="0" smtClean="0">
               <a:latin typeface="+mj-lt"/>
             </a:endParaRPr>
@@ -4678,6 +4693,12 @@
               </a:rPr>
               <a:t>Hidayat</a:t>
             </a:r>
+            <a:r>
+              <a:rPr lang="en-GB" sz="3200" dirty="0" smtClean="0">
+                <a:latin typeface="+mj-lt"/>
+              </a:rPr>
+              <a:t> (5112100125)</a:t>
+            </a:r>
             <a:endParaRPr lang="en-GB" sz="3200" dirty="0" smtClean="0">
               <a:latin typeface="+mj-lt"/>
             </a:endParaRPr>
@@ -4694,6 +4715,12 @@
                 <a:latin typeface="+mj-lt"/>
               </a:rPr>
               <a:t>Nuzal</a:t>
+            </a:r>
+            <a:r>
+              <a:rPr lang="en-GB" sz="3200" dirty="0" smtClean="0">
+                <a:latin typeface="+mj-lt"/>
+              </a:rPr>
+              <a:t> (5112100173)</a:t>
             </a:r>
             <a:endParaRPr lang="id-ID" sz="3200" dirty="0">
               <a:latin typeface="+mj-lt"/>
@@ -4869,13 +4896,7 @@
               <a:rPr lang="en-GB" dirty="0" smtClean="0">
                 <a:latin typeface="Bebas Neue" panose="020B0606020202050201" pitchFamily="34" charset="0"/>
               </a:rPr>
-              <a:t>Stream </a:t>
-            </a:r>
-            <a:r>
-              <a:rPr lang="en-GB" dirty="0" smtClean="0">
-                <a:latin typeface="Bebas Neue" panose="020B0606020202050201" pitchFamily="34" charset="0"/>
-              </a:rPr>
-              <a:t>cipher</a:t>
+              <a:t>Stream cipher</a:t>
             </a:r>
             <a:endParaRPr lang="id-ID" dirty="0">
               <a:latin typeface="Bebas Neue" panose="020B0606020202050201" pitchFamily="34" charset="0"/>

</xml_diff>